<commit_message>
input/output plot is added
</commit_message>
<xml_diff>
--- a/presentation/filter_presentation.pptx
+++ b/presentation/filter_presentation.pptx
@@ -5,7 +5,7 @@
     <p:sldMasterId id="2147483660" r:id="rId1"/>
   </p:sldMasterIdLst>
   <p:notesMasterIdLst>
-    <p:notesMasterId r:id="rId14"/>
+    <p:notesMasterId r:id="rId15"/>
   </p:notesMasterIdLst>
   <p:sldIdLst>
     <p:sldId id="256" r:id="rId2"/>
@@ -14,12 +14,13 @@
     <p:sldId id="264" r:id="rId5"/>
     <p:sldId id="271" r:id="rId6"/>
     <p:sldId id="263" r:id="rId7"/>
-    <p:sldId id="261" r:id="rId8"/>
-    <p:sldId id="270" r:id="rId9"/>
-    <p:sldId id="267" r:id="rId10"/>
-    <p:sldId id="268" r:id="rId11"/>
-    <p:sldId id="266" r:id="rId12"/>
-    <p:sldId id="269" r:id="rId13"/>
+    <p:sldId id="272" r:id="rId8"/>
+    <p:sldId id="261" r:id="rId9"/>
+    <p:sldId id="270" r:id="rId10"/>
+    <p:sldId id="267" r:id="rId11"/>
+    <p:sldId id="268" r:id="rId12"/>
+    <p:sldId id="266" r:id="rId13"/>
+    <p:sldId id="269" r:id="rId14"/>
   </p:sldIdLst>
   <p:sldSz cx="9144000" cy="6858000" type="screen4x3"/>
   <p:notesSz cx="6858000" cy="9144000"/>
@@ -861,7 +862,7 @@
           <a:p>
             <a:fld id="{ED04ABB4-D857-CD4A-BDD8-DDDB6CEB78C9}" type="slidenum">
               <a:rPr lang="en-US" smtClean="0"/>
-              <a:t>7</a:t>
+              <a:t>8</a:t>
             </a:fld>
             <a:endParaRPr lang="en-US"/>
           </a:p>
@@ -8377,6 +8378,146 @@
       </p:grpSpPr>
       <p:sp>
         <p:nvSpPr>
+          <p:cNvPr id="9" name="Title 8"/>
+          <p:cNvSpPr>
+            <a:spLocks noGrp="1"/>
+          </p:cNvSpPr>
+          <p:nvPr>
+            <p:ph type="title"/>
+          </p:nvPr>
+        </p:nvSpPr>
+        <p:spPr/>
+        <p:txBody>
+          <a:bodyPr/>
+          <a:lstStyle/>
+          <a:p>
+            <a:r>
+              <a:rPr lang="en-US" dirty="0" smtClean="0"/>
+              <a:t>Convolution Hardware</a:t>
+            </a:r>
+            <a:endParaRPr lang="en-US" dirty="0"/>
+          </a:p>
+        </p:txBody>
+      </p:sp>
+      <p:sp>
+        <p:nvSpPr>
+          <p:cNvPr id="10" name="Content Placeholder 9"/>
+          <p:cNvSpPr>
+            <a:spLocks noGrp="1"/>
+          </p:cNvSpPr>
+          <p:nvPr>
+            <p:ph sz="half" idx="2"/>
+          </p:nvPr>
+        </p:nvSpPr>
+        <p:spPr/>
+        <p:txBody>
+          <a:bodyPr/>
+          <a:lstStyle/>
+          <a:p>
+            <a:r>
+              <a:rPr lang="en-US" dirty="0" smtClean="0"/>
+              <a:t>Area = 5024508 micron</a:t>
+            </a:r>
+            <a:r>
+              <a:rPr lang="en-US" baseline="30000" dirty="0" smtClean="0"/>
+              <a:t>2</a:t>
+            </a:r>
+          </a:p>
+          <a:p>
+            <a:r>
+              <a:rPr lang="en-US" dirty="0" smtClean="0"/>
+              <a:t>3220 </a:t>
+            </a:r>
+            <a:r>
+              <a:rPr lang="en-US" dirty="0" err="1" smtClean="0"/>
+              <a:t>stdCells</a:t>
+            </a:r>
+            <a:endParaRPr lang="en-US" dirty="0" smtClean="0"/>
+          </a:p>
+          <a:p>
+            <a:r>
+              <a:rPr lang="en-US" dirty="0" smtClean="0"/>
+              <a:t>Encounter routing introduced DRC errors.</a:t>
+            </a:r>
+          </a:p>
+          <a:p>
+            <a:r>
+              <a:rPr lang="en-US" dirty="0" smtClean="0"/>
+              <a:t>Clearly see the four multipliers.</a:t>
+            </a:r>
+            <a:endParaRPr lang="en-US" dirty="0"/>
+          </a:p>
+        </p:txBody>
+      </p:sp>
+      <p:pic>
+        <p:nvPicPr>
+          <p:cNvPr id="12" name="Content Placeholder 11" descr="Screen shot 2010-12-06 at 2.03.41 PM.png"/>
+          <p:cNvPicPr>
+            <a:picLocks noGrp="1" noChangeAspect="1"/>
+          </p:cNvPicPr>
+          <p:nvPr>
+            <p:ph sz="half" idx="1"/>
+          </p:nvPr>
+        </p:nvPicPr>
+        <p:blipFill>
+          <a:blip r:embed="rId2">
+            <a:extLst>
+              <a:ext uri="{28A0092B-C50C-407E-A947-70E740481C1C}">
+                <a14:useLocalDpi xmlns:a14="http://schemas.microsoft.com/office/drawing/2010/main" val="0"/>
+              </a:ext>
+            </a:extLst>
+          </a:blip>
+          <a:srcRect t="-2643" b="-2643"/>
+          <a:stretch>
+            <a:fillRect/>
+          </a:stretch>
+        </p:blipFill>
+        <p:spPr>
+          <a:xfrm>
+            <a:off x="538163" y="2055813"/>
+            <a:ext cx="4016375" cy="4137025"/>
+          </a:xfrm>
+        </p:spPr>
+      </p:pic>
+    </p:spTree>
+    <p:extLst>
+      <p:ext uri="{BB962C8B-B14F-4D97-AF65-F5344CB8AC3E}">
+        <p14:creationId xmlns:p14="http://schemas.microsoft.com/office/powerpoint/2010/main" val="2192819047"/>
+      </p:ext>
+    </p:extLst>
+  </p:cSld>
+  <p:clrMapOvr>
+    <a:masterClrMapping/>
+  </p:clrMapOvr>
+  <p:timing>
+    <p:tnLst>
+      <p:par>
+        <p:cTn xmlns:p14="http://schemas.microsoft.com/office/powerpoint/2010/main" id="1" dur="indefinite" restart="never" nodeType="tmRoot"/>
+      </p:par>
+    </p:tnLst>
+  </p:timing>
+</p:sld>
+</file>
+
+<file path=ppt/slides/slide11.xml><?xml version="1.0" encoding="utf-8"?>
+<p:sld xmlns:a="http://schemas.openxmlformats.org/drawingml/2006/main" xmlns:r="http://schemas.openxmlformats.org/officeDocument/2006/relationships" xmlns:p="http://schemas.openxmlformats.org/presentationml/2006/main">
+  <p:cSld>
+    <p:spTree>
+      <p:nvGrpSpPr>
+        <p:cNvPr id="1" name=""/>
+        <p:cNvGrpSpPr/>
+        <p:nvPr/>
+      </p:nvGrpSpPr>
+      <p:grpSpPr>
+        <a:xfrm>
+          <a:off x="0" y="0"/>
+          <a:ext cx="0" cy="0"/>
+          <a:chOff x="0" y="0"/>
+          <a:chExt cx="0" cy="0"/>
+        </a:xfrm>
+      </p:grpSpPr>
+      <p:sp>
+        <p:nvSpPr>
           <p:cNvPr id="2" name="Title 1"/>
           <p:cNvSpPr>
             <a:spLocks noGrp="1"/>
@@ -8446,7 +8587,7 @@
 </p:sld>
 </file>
 
-<file path=ppt/slides/slide11.xml><?xml version="1.0" encoding="utf-8"?>
+<file path=ppt/slides/slide12.xml><?xml version="1.0" encoding="utf-8"?>
 <p:sld xmlns:a="http://schemas.openxmlformats.org/drawingml/2006/main" xmlns:r="http://schemas.openxmlformats.org/officeDocument/2006/relationships" xmlns:p="http://schemas.openxmlformats.org/presentationml/2006/main">
   <p:cSld>
     <p:spTree>
@@ -8577,7 +8718,7 @@
 </p:sld>
 </file>
 
-<file path=ppt/slides/slide12.xml><?xml version="1.0" encoding="utf-8"?>
+<file path=ppt/slides/slide13.xml><?xml version="1.0" encoding="utf-8"?>
 <p:sld xmlns:a="http://schemas.openxmlformats.org/drawingml/2006/main" xmlns:r="http://schemas.openxmlformats.org/officeDocument/2006/relationships" xmlns:p="http://schemas.openxmlformats.org/presentationml/2006/main">
   <p:cSld>
     <p:spTree>
@@ -9602,6 +9743,636 @@
       </p:grpSpPr>
       <p:sp>
         <p:nvSpPr>
+          <p:cNvPr id="5" name="Title 4"/>
+          <p:cNvSpPr>
+            <a:spLocks noGrp="1"/>
+          </p:cNvSpPr>
+          <p:nvPr>
+            <p:ph type="title"/>
+          </p:nvPr>
+        </p:nvSpPr>
+        <p:spPr/>
+        <p:txBody>
+          <a:bodyPr/>
+          <a:lstStyle/>
+          <a:p>
+            <a:r>
+              <a:rPr lang="en-US" dirty="0" smtClean="0"/>
+              <a:t>Test Case Example</a:t>
+            </a:r>
+            <a:endParaRPr lang="en-US" dirty="0"/>
+          </a:p>
+        </p:txBody>
+      </p:sp>
+      <p:pic>
+        <p:nvPicPr>
+          <p:cNvPr id="7" name="Content Placeholder 6" descr="testcase_plot.png"/>
+          <p:cNvPicPr>
+            <a:picLocks noGrp="1" noChangeAspect="1"/>
+          </p:cNvPicPr>
+          <p:nvPr>
+            <p:ph idx="1"/>
+          </p:nvPr>
+        </p:nvPicPr>
+        <p:blipFill>
+          <a:blip r:embed="rId2">
+            <a:extLst>
+              <a:ext uri="{28A0092B-C50C-407E-A947-70E740481C1C}">
+                <a14:useLocalDpi xmlns:a14="http://schemas.microsoft.com/office/drawing/2010/main" val="0"/>
+              </a:ext>
+            </a:extLst>
+          </a:blip>
+          <a:srcRect t="-9588" b="-9588"/>
+          <a:stretch>
+            <a:fillRect/>
+          </a:stretch>
+        </p:blipFill>
+        <p:spPr>
+          <a:xfrm>
+            <a:off x="662829" y="2133601"/>
+            <a:ext cx="4896319" cy="3931920"/>
+          </a:xfrm>
+        </p:spPr>
+      </p:pic>
+      <p:sp>
+        <p:nvSpPr>
+          <p:cNvPr id="8" name="Rectangle 7"/>
+          <p:cNvSpPr/>
+          <p:nvPr/>
+        </p:nvSpPr>
+        <p:spPr>
+          <a:xfrm>
+            <a:off x="5658493" y="1772247"/>
+            <a:ext cx="1313569" cy="3970318"/>
+          </a:xfrm>
+          <a:prstGeom prst="rect">
+            <a:avLst/>
+          </a:prstGeom>
+        </p:spPr>
+        <p:txBody>
+          <a:bodyPr wrap="square">
+            <a:spAutoFit/>
+          </a:bodyPr>
+          <a:lstStyle/>
+          <a:p>
+            <a:r>
+              <a:rPr lang="en-US" sz="1200" dirty="0" smtClean="0">
+                <a:solidFill>
+                  <a:schemeClr val="bg1">
+                    <a:lumMod val="65000"/>
+                  </a:schemeClr>
+                </a:solidFill>
+                <a:latin typeface="Consolas"/>
+                <a:cs typeface="Consolas"/>
+              </a:rPr>
+              <a:t>Input:</a:t>
+            </a:r>
+          </a:p>
+          <a:p>
+            <a:r>
+              <a:rPr lang="en-US" sz="1000" dirty="0" smtClean="0">
+                <a:latin typeface="Consolas"/>
+                <a:cs typeface="Consolas"/>
+              </a:rPr>
+              <a:t>1110011001100111</a:t>
+            </a:r>
+            <a:endParaRPr lang="en-US" sz="1000" dirty="0">
+              <a:latin typeface="Consolas"/>
+              <a:cs typeface="Consolas"/>
+            </a:endParaRPr>
+          </a:p>
+          <a:p>
+            <a:r>
+              <a:rPr lang="en-US" sz="1000" dirty="0">
+                <a:latin typeface="Consolas"/>
+                <a:cs typeface="Consolas"/>
+              </a:rPr>
+              <a:t>1111000001000111</a:t>
+            </a:r>
+          </a:p>
+          <a:p>
+            <a:r>
+              <a:rPr lang="en-US" sz="1000" dirty="0">
+                <a:latin typeface="Consolas"/>
+                <a:cs typeface="Consolas"/>
+              </a:rPr>
+              <a:t>0001001101011100</a:t>
+            </a:r>
+          </a:p>
+          <a:p>
+            <a:r>
+              <a:rPr lang="en-US" sz="1000" dirty="0">
+                <a:latin typeface="Consolas"/>
+                <a:cs typeface="Consolas"/>
+              </a:rPr>
+              <a:t>0000011101000101</a:t>
+            </a:r>
+          </a:p>
+          <a:p>
+            <a:r>
+              <a:rPr lang="en-US" sz="1000" dirty="0">
+                <a:latin typeface="Consolas"/>
+                <a:cs typeface="Consolas"/>
+              </a:rPr>
+              <a:t>0000111000101001</a:t>
+            </a:r>
+          </a:p>
+          <a:p>
+            <a:r>
+              <a:rPr lang="en-US" sz="1000" dirty="0">
+                <a:latin typeface="Consolas"/>
+                <a:cs typeface="Consolas"/>
+              </a:rPr>
+              <a:t>0000000100101001</a:t>
+            </a:r>
+          </a:p>
+          <a:p>
+            <a:r>
+              <a:rPr lang="en-US" sz="1000" dirty="0">
+                <a:latin typeface="Consolas"/>
+                <a:cs typeface="Consolas"/>
+              </a:rPr>
+              <a:t>1111101101100011</a:t>
+            </a:r>
+          </a:p>
+          <a:p>
+            <a:r>
+              <a:rPr lang="en-US" sz="1000" dirty="0">
+                <a:latin typeface="Consolas"/>
+                <a:cs typeface="Consolas"/>
+              </a:rPr>
+              <a:t>0001111010110111</a:t>
+            </a:r>
+          </a:p>
+          <a:p>
+            <a:r>
+              <a:rPr lang="en-US" sz="1000" dirty="0">
+                <a:latin typeface="Consolas"/>
+                <a:cs typeface="Consolas"/>
+              </a:rPr>
+              <a:t>0010000110101011</a:t>
+            </a:r>
+          </a:p>
+          <a:p>
+            <a:r>
+              <a:rPr lang="en-US" sz="1000" dirty="0">
+                <a:latin typeface="Consolas"/>
+                <a:cs typeface="Consolas"/>
+              </a:rPr>
+              <a:t>0011000110011110</a:t>
+            </a:r>
+          </a:p>
+          <a:p>
+            <a:r>
+              <a:rPr lang="en-US" sz="1000" dirty="0">
+                <a:latin typeface="Consolas"/>
+                <a:cs typeface="Consolas"/>
+              </a:rPr>
+              <a:t>0001100000110100</a:t>
+            </a:r>
+          </a:p>
+          <a:p>
+            <a:r>
+              <a:rPr lang="en-US" sz="1000" dirty="0">
+                <a:latin typeface="Consolas"/>
+                <a:cs typeface="Consolas"/>
+              </a:rPr>
+              <a:t>0010000111100101</a:t>
+            </a:r>
+          </a:p>
+          <a:p>
+            <a:r>
+              <a:rPr lang="en-US" sz="1000" dirty="0">
+                <a:latin typeface="Consolas"/>
+                <a:cs typeface="Consolas"/>
+              </a:rPr>
+              <a:t>0011010010000000</a:t>
+            </a:r>
+          </a:p>
+          <a:p>
+            <a:r>
+              <a:rPr lang="en-US" sz="1000" dirty="0">
+                <a:latin typeface="Consolas"/>
+                <a:cs typeface="Consolas"/>
+              </a:rPr>
+              <a:t>0000111001001011</a:t>
+            </a:r>
+          </a:p>
+          <a:p>
+            <a:r>
+              <a:rPr lang="en-US" sz="1000" dirty="0">
+                <a:latin typeface="Consolas"/>
+                <a:cs typeface="Consolas"/>
+              </a:rPr>
+              <a:t>0001000110111100</a:t>
+            </a:r>
+          </a:p>
+          <a:p>
+            <a:r>
+              <a:rPr lang="en-US" sz="1000" dirty="0">
+                <a:latin typeface="Consolas"/>
+                <a:cs typeface="Consolas"/>
+              </a:rPr>
+              <a:t>0010110001111111</a:t>
+            </a:r>
+          </a:p>
+          <a:p>
+            <a:r>
+              <a:rPr lang="en-US" sz="1000" dirty="0">
+                <a:latin typeface="Consolas"/>
+                <a:cs typeface="Consolas"/>
+              </a:rPr>
+              <a:t>0011011000000100</a:t>
+            </a:r>
+          </a:p>
+          <a:p>
+            <a:r>
+              <a:rPr lang="en-US" sz="1000" dirty="0">
+                <a:latin typeface="Consolas"/>
+                <a:cs typeface="Consolas"/>
+              </a:rPr>
+              <a:t>0001011000110110</a:t>
+            </a:r>
+          </a:p>
+          <a:p>
+            <a:r>
+              <a:rPr lang="en-US" sz="1000" dirty="0">
+                <a:latin typeface="Consolas"/>
+                <a:cs typeface="Consolas"/>
+              </a:rPr>
+              <a:t>0010101110000000</a:t>
+            </a:r>
+          </a:p>
+          <a:p>
+            <a:r>
+              <a:rPr lang="en-US" sz="1000" dirty="0">
+                <a:latin typeface="Consolas"/>
+                <a:cs typeface="Consolas"/>
+              </a:rPr>
+              <a:t>0001110100111001</a:t>
+            </a:r>
+          </a:p>
+          <a:p>
+            <a:r>
+              <a:rPr lang="en-US" sz="1000" dirty="0">
+                <a:latin typeface="Consolas"/>
+                <a:cs typeface="Consolas"/>
+              </a:rPr>
+              <a:t>0011000011111101</a:t>
+            </a:r>
+          </a:p>
+          <a:p>
+            <a:r>
+              <a:rPr lang="en-US" sz="1000" dirty="0">
+                <a:latin typeface="Consolas"/>
+                <a:cs typeface="Consolas"/>
+              </a:rPr>
+              <a:t>0100000001110100</a:t>
+            </a:r>
+          </a:p>
+          <a:p>
+            <a:r>
+              <a:rPr lang="en-US" sz="1000" dirty="0">
+                <a:latin typeface="Consolas"/>
+                <a:cs typeface="Consolas"/>
+              </a:rPr>
+              <a:t>0011110011111111</a:t>
+            </a:r>
+          </a:p>
+          <a:p>
+            <a:r>
+              <a:rPr lang="en-US" sz="1000" dirty="0">
+                <a:latin typeface="Consolas"/>
+                <a:cs typeface="Consolas"/>
+              </a:rPr>
+              <a:t>0100111111100100</a:t>
+            </a:r>
+          </a:p>
+        </p:txBody>
+      </p:sp>
+      <p:sp>
+        <p:nvSpPr>
+          <p:cNvPr id="10" name="Rectangle 9"/>
+          <p:cNvSpPr/>
+          <p:nvPr/>
+        </p:nvSpPr>
+        <p:spPr>
+          <a:xfrm>
+            <a:off x="7345583" y="2315019"/>
+            <a:ext cx="1633158" cy="4093428"/>
+          </a:xfrm>
+          <a:prstGeom prst="rect">
+            <a:avLst/>
+          </a:prstGeom>
+        </p:spPr>
+        <p:txBody>
+          <a:bodyPr wrap="square">
+            <a:spAutoFit/>
+          </a:bodyPr>
+          <a:lstStyle/>
+          <a:p>
+            <a:r>
+              <a:rPr lang="en-US" sz="1200" dirty="0" smtClean="0">
+                <a:solidFill>
+                  <a:srgbClr val="A6A6A6"/>
+                </a:solidFill>
+                <a:latin typeface="Consolas"/>
+                <a:cs typeface="Consolas"/>
+              </a:rPr>
+              <a:t>Output:</a:t>
+            </a:r>
+          </a:p>
+          <a:p>
+            <a:r>
+              <a:rPr lang="en-US" sz="1000" dirty="0" smtClean="0">
+                <a:latin typeface="Consolas"/>
+                <a:cs typeface="Consolas"/>
+              </a:rPr>
+              <a:t>0000000001001010</a:t>
+            </a:r>
+            <a:endParaRPr lang="en-US" sz="1000" dirty="0">
+              <a:latin typeface="Consolas"/>
+              <a:cs typeface="Consolas"/>
+            </a:endParaRPr>
+          </a:p>
+          <a:p>
+            <a:r>
+              <a:rPr lang="en-US" sz="1000" dirty="0">
+                <a:latin typeface="Consolas"/>
+                <a:cs typeface="Consolas"/>
+              </a:rPr>
+              <a:t>0000000000101101</a:t>
+            </a:r>
+          </a:p>
+          <a:p>
+            <a:r>
+              <a:rPr lang="en-US" sz="1000" dirty="0">
+                <a:latin typeface="Consolas"/>
+                <a:cs typeface="Consolas"/>
+              </a:rPr>
+              <a:t>1111110001000101</a:t>
+            </a:r>
+          </a:p>
+          <a:p>
+            <a:r>
+              <a:rPr lang="en-US" sz="1000" dirty="0">
+                <a:latin typeface="Consolas"/>
+                <a:cs typeface="Consolas"/>
+              </a:rPr>
+              <a:t>1111011101100100</a:t>
+            </a:r>
+          </a:p>
+          <a:p>
+            <a:r>
+              <a:rPr lang="en-US" sz="1000" dirty="0">
+                <a:latin typeface="Consolas"/>
+                <a:cs typeface="Consolas"/>
+              </a:rPr>
+              <a:t>1111101100010010</a:t>
+            </a:r>
+          </a:p>
+          <a:p>
+            <a:r>
+              <a:rPr lang="en-US" sz="1000" dirty="0">
+                <a:latin typeface="Consolas"/>
+                <a:cs typeface="Consolas"/>
+              </a:rPr>
+              <a:t>0000001110100011</a:t>
+            </a:r>
+          </a:p>
+          <a:p>
+            <a:r>
+              <a:rPr lang="en-US" sz="1000" dirty="0">
+                <a:latin typeface="Consolas"/>
+                <a:cs typeface="Consolas"/>
+              </a:rPr>
+              <a:t>0000011010111100</a:t>
+            </a:r>
+          </a:p>
+          <a:p>
+            <a:r>
+              <a:rPr lang="en-US" sz="1000" dirty="0">
+                <a:latin typeface="Consolas"/>
+                <a:cs typeface="Consolas"/>
+              </a:rPr>
+              <a:t>0000010010000000</a:t>
+            </a:r>
+          </a:p>
+          <a:p>
+            <a:r>
+              <a:rPr lang="en-US" sz="1000" dirty="0">
+                <a:latin typeface="Consolas"/>
+                <a:cs typeface="Consolas"/>
+              </a:rPr>
+              <a:t>0000000011111101</a:t>
+            </a:r>
+          </a:p>
+          <a:p>
+            <a:r>
+              <a:rPr lang="en-US" sz="1000" dirty="0">
+                <a:latin typeface="Consolas"/>
+                <a:cs typeface="Consolas"/>
+              </a:rPr>
+              <a:t>0000001010010010</a:t>
+            </a:r>
+          </a:p>
+          <a:p>
+            <a:r>
+              <a:rPr lang="en-US" sz="1000" dirty="0">
+                <a:latin typeface="Consolas"/>
+                <a:cs typeface="Consolas"/>
+              </a:rPr>
+              <a:t>0000101100101101</a:t>
+            </a:r>
+          </a:p>
+          <a:p>
+            <a:r>
+              <a:rPr lang="en-US" sz="1000" dirty="0">
+                <a:latin typeface="Consolas"/>
+                <a:cs typeface="Consolas"/>
+              </a:rPr>
+              <a:t>0001001011111001</a:t>
+            </a:r>
+          </a:p>
+          <a:p>
+            <a:r>
+              <a:rPr lang="en-US" sz="1000" dirty="0">
+                <a:latin typeface="Consolas"/>
+                <a:cs typeface="Consolas"/>
+              </a:rPr>
+              <a:t>0001001110111000</a:t>
+            </a:r>
+          </a:p>
+          <a:p>
+            <a:r>
+              <a:rPr lang="en-US" sz="1000" dirty="0">
+                <a:latin typeface="Consolas"/>
+                <a:cs typeface="Consolas"/>
+              </a:rPr>
+              <a:t>0001000011110001</a:t>
+            </a:r>
+          </a:p>
+          <a:p>
+            <a:r>
+              <a:rPr lang="en-US" sz="1000" dirty="0">
+                <a:latin typeface="Consolas"/>
+                <a:cs typeface="Consolas"/>
+              </a:rPr>
+              <a:t>0001001001011001</a:t>
+            </a:r>
+          </a:p>
+          <a:p>
+            <a:r>
+              <a:rPr lang="en-US" sz="1000" dirty="0">
+                <a:latin typeface="Consolas"/>
+                <a:cs typeface="Consolas"/>
+              </a:rPr>
+              <a:t>0001001010010110</a:t>
+            </a:r>
+          </a:p>
+          <a:p>
+            <a:r>
+              <a:rPr lang="en-US" sz="1000" dirty="0">
+                <a:latin typeface="Consolas"/>
+                <a:cs typeface="Consolas"/>
+              </a:rPr>
+              <a:t>0000110001001000</a:t>
+            </a:r>
+          </a:p>
+          <a:p>
+            <a:r>
+              <a:rPr lang="en-US" sz="1000" dirty="0">
+                <a:latin typeface="Consolas"/>
+                <a:cs typeface="Consolas"/>
+              </a:rPr>
+              <a:t>0000101111010010</a:t>
+            </a:r>
+          </a:p>
+          <a:p>
+            <a:r>
+              <a:rPr lang="en-US" sz="1000" dirty="0">
+                <a:latin typeface="Consolas"/>
+                <a:cs typeface="Consolas"/>
+              </a:rPr>
+              <a:t>0001001111001101</a:t>
+            </a:r>
+          </a:p>
+          <a:p>
+            <a:r>
+              <a:rPr lang="en-US" sz="1000" dirty="0">
+                <a:latin typeface="Consolas"/>
+                <a:cs typeface="Consolas"/>
+              </a:rPr>
+              <a:t>0001011000010010</a:t>
+            </a:r>
+          </a:p>
+          <a:p>
+            <a:r>
+              <a:rPr lang="en-US" sz="1000" dirty="0">
+                <a:latin typeface="Consolas"/>
+                <a:cs typeface="Consolas"/>
+              </a:rPr>
+              <a:t>0001001000011110</a:t>
+            </a:r>
+          </a:p>
+          <a:p>
+            <a:r>
+              <a:rPr lang="en-US" sz="1000" dirty="0">
+                <a:latin typeface="Consolas"/>
+                <a:cs typeface="Consolas"/>
+              </a:rPr>
+              <a:t>0001000010100000</a:t>
+            </a:r>
+          </a:p>
+          <a:p>
+            <a:r>
+              <a:rPr lang="en-US" sz="1000" dirty="0">
+                <a:latin typeface="Consolas"/>
+                <a:cs typeface="Consolas"/>
+              </a:rPr>
+              <a:t>0001001010100001</a:t>
+            </a:r>
+          </a:p>
+          <a:p>
+            <a:r>
+              <a:rPr lang="en-US" sz="1000" dirty="0" smtClean="0">
+                <a:latin typeface="Consolas"/>
+                <a:cs typeface="Consolas"/>
+              </a:rPr>
+              <a:t>0001011111011010</a:t>
+            </a:r>
+            <a:endParaRPr lang="en-US" sz="1000" dirty="0">
+              <a:latin typeface="Consolas"/>
+              <a:cs typeface="Consolas"/>
+            </a:endParaRPr>
+          </a:p>
+        </p:txBody>
+      </p:sp>
+      <p:cxnSp>
+        <p:nvCxnSpPr>
+          <p:cNvPr id="13" name="Straight Arrow Connector 12"/>
+          <p:cNvCxnSpPr/>
+          <p:nvPr/>
+        </p:nvCxnSpPr>
+        <p:spPr>
+          <a:xfrm>
+            <a:off x="6972062" y="3876281"/>
+            <a:ext cx="373521" cy="237750"/>
+          </a:xfrm>
+          <a:prstGeom prst="straightConnector1">
+            <a:avLst/>
+          </a:prstGeom>
+          <a:ln>
+            <a:tailEnd type="arrow"/>
+          </a:ln>
+        </p:spPr>
+        <p:style>
+          <a:lnRef idx="2">
+            <a:schemeClr val="accent1"/>
+          </a:lnRef>
+          <a:fillRef idx="0">
+            <a:schemeClr val="accent1"/>
+          </a:fillRef>
+          <a:effectRef idx="1">
+            <a:schemeClr val="accent1"/>
+          </a:effectRef>
+          <a:fontRef idx="minor">
+            <a:schemeClr val="tx1"/>
+          </a:fontRef>
+        </p:style>
+      </p:cxnSp>
+    </p:spTree>
+    <p:extLst>
+      <p:ext uri="{BB962C8B-B14F-4D97-AF65-F5344CB8AC3E}">
+        <p14:creationId xmlns:p14="http://schemas.microsoft.com/office/powerpoint/2010/main" val="3432284704"/>
+      </p:ext>
+    </p:extLst>
+  </p:cSld>
+  <p:clrMapOvr>
+    <a:masterClrMapping/>
+  </p:clrMapOvr>
+</p:sld>
+</file>
+
+<file path=ppt/slides/slide8.xml><?xml version="1.0" encoding="utf-8"?>
+<p:sld xmlns:a="http://schemas.openxmlformats.org/drawingml/2006/main" xmlns:r="http://schemas.openxmlformats.org/officeDocument/2006/relationships" xmlns:p="http://schemas.openxmlformats.org/presentationml/2006/main">
+  <p:cSld>
+    <p:spTree>
+      <p:nvGrpSpPr>
+        <p:cNvPr id="1" name=""/>
+        <p:cNvGrpSpPr/>
+        <p:nvPr/>
+      </p:nvGrpSpPr>
+      <p:grpSpPr>
+        <a:xfrm>
+          <a:off x="0" y="0"/>
+          <a:ext cx="0" cy="0"/>
+          <a:chOff x="0" y="0"/>
+          <a:chExt cx="0" cy="0"/>
+        </a:xfrm>
+      </p:grpSpPr>
+      <p:sp>
+        <p:nvSpPr>
           <p:cNvPr id="2" name="Title 1"/>
           <p:cNvSpPr>
             <a:spLocks noGrp="1"/>
@@ -9776,128 +10547,6 @@
     <p:extLst>
       <p:ext uri="{BB962C8B-B14F-4D97-AF65-F5344CB8AC3E}">
         <p14:creationId xmlns:p14="http://schemas.microsoft.com/office/powerpoint/2010/main" val="2992949676"/>
-      </p:ext>
-    </p:extLst>
-  </p:cSld>
-  <p:clrMapOvr>
-    <a:masterClrMapping/>
-  </p:clrMapOvr>
-  <p:timing>
-    <p:tnLst>
-      <p:par>
-        <p:cTn xmlns:p14="http://schemas.microsoft.com/office/powerpoint/2010/main" id="1" dur="indefinite" restart="never" nodeType="tmRoot"/>
-      </p:par>
-    </p:tnLst>
-  </p:timing>
-</p:sld>
-</file>
-
-<file path=ppt/slides/slide8.xml><?xml version="1.0" encoding="utf-8"?>
-<p:sld xmlns:a="http://schemas.openxmlformats.org/drawingml/2006/main" xmlns:r="http://schemas.openxmlformats.org/officeDocument/2006/relationships" xmlns:p="http://schemas.openxmlformats.org/presentationml/2006/main">
-  <p:cSld>
-    <p:spTree>
-      <p:nvGrpSpPr>
-        <p:cNvPr id="1" name=""/>
-        <p:cNvGrpSpPr/>
-        <p:nvPr/>
-      </p:nvGrpSpPr>
-      <p:grpSpPr>
-        <a:xfrm>
-          <a:off x="0" y="0"/>
-          <a:ext cx="0" cy="0"/>
-          <a:chOff x="0" y="0"/>
-          <a:chExt cx="0" cy="0"/>
-        </a:xfrm>
-      </p:grpSpPr>
-      <p:sp>
-        <p:nvSpPr>
-          <p:cNvPr id="2" name="Title 1"/>
-          <p:cNvSpPr>
-            <a:spLocks noGrp="1"/>
-          </p:cNvSpPr>
-          <p:nvPr>
-            <p:ph type="title"/>
-          </p:nvPr>
-        </p:nvSpPr>
-        <p:spPr/>
-        <p:txBody>
-          <a:bodyPr/>
-          <a:lstStyle/>
-          <a:p>
-            <a:r>
-              <a:rPr lang="en-US" dirty="0" smtClean="0"/>
-              <a:t>Optimization</a:t>
-            </a:r>
-            <a:endParaRPr lang="en-US" dirty="0"/>
-          </a:p>
-        </p:txBody>
-      </p:sp>
-      <p:sp>
-        <p:nvSpPr>
-          <p:cNvPr id="5" name="Content Placeholder 4"/>
-          <p:cNvSpPr>
-            <a:spLocks noGrp="1"/>
-          </p:cNvSpPr>
-          <p:nvPr>
-            <p:ph idx="1"/>
-          </p:nvPr>
-        </p:nvSpPr>
-        <p:spPr/>
-        <p:txBody>
-          <a:bodyPr/>
-          <a:lstStyle/>
-          <a:p>
-            <a:r>
-              <a:rPr lang="en-US" dirty="0" smtClean="0"/>
-              <a:t>Removed 3 Multipliers</a:t>
-            </a:r>
-          </a:p>
-          <a:p>
-            <a:endParaRPr lang="en-US" dirty="0" smtClean="0"/>
-          </a:p>
-          <a:p>
-            <a:pPr>
-              <a:buFont typeface="Arial"/>
-              <a:buChar char="•"/>
-            </a:pPr>
-            <a:r>
-              <a:rPr lang="en-US" dirty="0" smtClean="0"/>
-              <a:t>Replaced with optimized Adders.</a:t>
-            </a:r>
-          </a:p>
-          <a:p>
-            <a:pPr lvl="1">
-              <a:buFont typeface="Arial"/>
-              <a:buChar char="•"/>
-            </a:pPr>
-            <a:r>
-              <a:rPr lang="en-US" dirty="0" smtClean="0"/>
-              <a:t>Ripple-Carry adders for power optimization.</a:t>
-            </a:r>
-          </a:p>
-          <a:p>
-            <a:pPr lvl="1">
-              <a:buFont typeface="Arial"/>
-              <a:buChar char="•"/>
-            </a:pPr>
-            <a:endParaRPr lang="en-US" dirty="0"/>
-          </a:p>
-          <a:p>
-            <a:pPr>
-              <a:buFont typeface="Arial"/>
-              <a:buChar char="•"/>
-            </a:pPr>
-            <a:r>
-              <a:rPr lang="en-US" dirty="0" smtClean="0"/>
-              <a:t>Reduced clock frequency to reduce transitions.</a:t>
-            </a:r>
-          </a:p>
-        </p:txBody>
-      </p:sp>
-    </p:spTree>
-    <p:extLst>
-      <p:ext uri="{BB962C8B-B14F-4D97-AF65-F5344CB8AC3E}">
-        <p14:creationId xmlns:p14="http://schemas.microsoft.com/office/powerpoint/2010/main" val="974513610"/>
       </p:ext>
     </p:extLst>
   </p:cSld>
@@ -9933,7 +10582,7 @@
       </p:grpSpPr>
       <p:sp>
         <p:nvSpPr>
-          <p:cNvPr id="9" name="Title 8"/>
+          <p:cNvPr id="2" name="Title 1"/>
           <p:cNvSpPr>
             <a:spLocks noGrp="1"/>
           </p:cNvSpPr>
@@ -9948,7 +10597,7 @@
           <a:p>
             <a:r>
               <a:rPr lang="en-US" dirty="0" smtClean="0"/>
-              <a:t>Convolution Hardware</a:t>
+              <a:t>Optimization</a:t>
             </a:r>
             <a:endParaRPr lang="en-US" dirty="0"/>
           </a:p>
@@ -9956,12 +10605,12 @@
       </p:sp>
       <p:sp>
         <p:nvSpPr>
-          <p:cNvPr id="10" name="Content Placeholder 9"/>
-          <p:cNvSpPr>
-            <a:spLocks noGrp="1"/>
-          </p:cNvSpPr>
-          <p:nvPr>
-            <p:ph sz="half" idx="2"/>
+          <p:cNvPr id="5" name="Content Placeholder 4"/>
+          <p:cNvSpPr>
+            <a:spLocks noGrp="1"/>
+          </p:cNvSpPr>
+          <p:nvPr>
+            <p:ph idx="1"/>
           </p:nvPr>
         </p:nvSpPr>
         <p:spPr/>
@@ -9971,73 +10620,55 @@
           <a:p>
             <a:r>
               <a:rPr lang="en-US" dirty="0" smtClean="0"/>
-              <a:t>Area = 5024508 micron</a:t>
-            </a:r>
-            <a:r>
-              <a:rPr lang="en-US" baseline="30000" dirty="0" smtClean="0"/>
-              <a:t>2</a:t>
-            </a:r>
-          </a:p>
-          <a:p>
+              <a:t>Removed 3 Multipliers</a:t>
+            </a:r>
+          </a:p>
+          <a:p>
+            <a:endParaRPr lang="en-US" dirty="0" smtClean="0"/>
+          </a:p>
+          <a:p>
+            <a:pPr>
+              <a:buFont typeface="Arial"/>
+              <a:buChar char="•"/>
+            </a:pPr>
             <a:r>
               <a:rPr lang="en-US" dirty="0" smtClean="0"/>
-              <a:t>3220 </a:t>
-            </a:r>
-            <a:r>
-              <a:rPr lang="en-US" dirty="0" err="1" smtClean="0"/>
-              <a:t>stdCells</a:t>
-            </a:r>
-            <a:endParaRPr lang="en-US" dirty="0" smtClean="0"/>
-          </a:p>
-          <a:p>
+              <a:t>Replaced with optimized Adders.</a:t>
+            </a:r>
+          </a:p>
+          <a:p>
+            <a:pPr lvl="1">
+              <a:buFont typeface="Arial"/>
+              <a:buChar char="•"/>
+            </a:pPr>
             <a:r>
               <a:rPr lang="en-US" dirty="0" smtClean="0"/>
-              <a:t>Encounter routing introduced DRC errors.</a:t>
-            </a:r>
-          </a:p>
-          <a:p>
+              <a:t>Ripple-Carry adders for power optimization.</a:t>
+            </a:r>
+          </a:p>
+          <a:p>
+            <a:pPr lvl="1">
+              <a:buFont typeface="Arial"/>
+              <a:buChar char="•"/>
+            </a:pPr>
+            <a:endParaRPr lang="en-US" dirty="0"/>
+          </a:p>
+          <a:p>
+            <a:pPr>
+              <a:buFont typeface="Arial"/>
+              <a:buChar char="•"/>
+            </a:pPr>
             <a:r>
               <a:rPr lang="en-US" dirty="0" smtClean="0"/>
-              <a:t>Clearly see the four multipliers.</a:t>
-            </a:r>
-            <a:endParaRPr lang="en-US" dirty="0"/>
-          </a:p>
-        </p:txBody>
-      </p:sp>
-      <p:pic>
-        <p:nvPicPr>
-          <p:cNvPr id="12" name="Content Placeholder 11" descr="Screen shot 2010-12-06 at 2.03.41 PM.png"/>
-          <p:cNvPicPr>
-            <a:picLocks noGrp="1" noChangeAspect="1"/>
-          </p:cNvPicPr>
-          <p:nvPr>
-            <p:ph sz="half" idx="1"/>
-          </p:nvPr>
-        </p:nvPicPr>
-        <p:blipFill>
-          <a:blip r:embed="rId2">
-            <a:extLst>
-              <a:ext uri="{28A0092B-C50C-407E-A947-70E740481C1C}">
-                <a14:useLocalDpi xmlns:a14="http://schemas.microsoft.com/office/drawing/2010/main" val="0"/>
-              </a:ext>
-            </a:extLst>
-          </a:blip>
-          <a:srcRect t="-2643" b="-2643"/>
-          <a:stretch>
-            <a:fillRect/>
-          </a:stretch>
-        </p:blipFill>
-        <p:spPr>
-          <a:xfrm>
-            <a:off x="538163" y="2055813"/>
-            <a:ext cx="4016375" cy="4137025"/>
-          </a:xfrm>
-        </p:spPr>
-      </p:pic>
+              <a:t>Reduced clock frequency to reduce transitions.</a:t>
+            </a:r>
+          </a:p>
+        </p:txBody>
+      </p:sp>
     </p:spTree>
     <p:extLst>
       <p:ext uri="{BB962C8B-B14F-4D97-AF65-F5344CB8AC3E}">
-        <p14:creationId xmlns:p14="http://schemas.microsoft.com/office/powerpoint/2010/main" val="2192819047"/>
+        <p14:creationId xmlns:p14="http://schemas.microsoft.com/office/powerpoint/2010/main" val="974513610"/>
       </p:ext>
     </p:extLst>
   </p:cSld>

</xml_diff>